<commit_message>
stories 6,7,8 & 8a added
</commit_message>
<xml_diff>
--- a/Things.pptx
+++ b/Things.pptx
@@ -12,6 +12,10 @@
     <p:sldId id="261" r:id="rId6"/>
     <p:sldId id="262" r:id="rId7"/>
     <p:sldId id="263" r:id="rId8"/>
+    <p:sldId id="264" r:id="rId9"/>
+    <p:sldId id="265" r:id="rId10"/>
+    <p:sldId id="266" r:id="rId11"/>
+    <p:sldId id="267" r:id="rId12"/>
   </p:sldIdLst>
   <p:sldSz cx="9906000" cy="6858000" type="A4"/>
   <p:notesSz cx="6858000" cy="9144000"/>
@@ -311,7 +315,7 @@
             <a:fld id="{1585DAA5-6BE2-467A-90B2-00E985D86198}" type="datetimeFigureOut">
               <a:rPr lang="en-AU" smtClean="0"/>
               <a:pPr/>
-              <a:t>9/03/2017</a:t>
+              <a:t>12/03/2017</a:t>
             </a:fld>
             <a:endParaRPr lang="en-AU"/>
           </a:p>
@@ -478,7 +482,7 @@
             <a:fld id="{1585DAA5-6BE2-467A-90B2-00E985D86198}" type="datetimeFigureOut">
               <a:rPr lang="en-AU" smtClean="0"/>
               <a:pPr/>
-              <a:t>9/03/2017</a:t>
+              <a:t>12/03/2017</a:t>
             </a:fld>
             <a:endParaRPr lang="en-AU"/>
           </a:p>
@@ -655,7 +659,7 @@
             <a:fld id="{1585DAA5-6BE2-467A-90B2-00E985D86198}" type="datetimeFigureOut">
               <a:rPr lang="en-AU" smtClean="0"/>
               <a:pPr/>
-              <a:t>9/03/2017</a:t>
+              <a:t>12/03/2017</a:t>
             </a:fld>
             <a:endParaRPr lang="en-AU"/>
           </a:p>
@@ -822,7 +826,7 @@
             <a:fld id="{1585DAA5-6BE2-467A-90B2-00E985D86198}" type="datetimeFigureOut">
               <a:rPr lang="en-AU" smtClean="0"/>
               <a:pPr/>
-              <a:t>9/03/2017</a:t>
+              <a:t>12/03/2017</a:t>
             </a:fld>
             <a:endParaRPr lang="en-AU"/>
           </a:p>
@@ -1065,7 +1069,7 @@
             <a:fld id="{1585DAA5-6BE2-467A-90B2-00E985D86198}" type="datetimeFigureOut">
               <a:rPr lang="en-AU" smtClean="0"/>
               <a:pPr/>
-              <a:t>9/03/2017</a:t>
+              <a:t>12/03/2017</a:t>
             </a:fld>
             <a:endParaRPr lang="en-AU"/>
           </a:p>
@@ -1350,7 +1354,7 @@
             <a:fld id="{1585DAA5-6BE2-467A-90B2-00E985D86198}" type="datetimeFigureOut">
               <a:rPr lang="en-AU" smtClean="0"/>
               <a:pPr/>
-              <a:t>9/03/2017</a:t>
+              <a:t>12/03/2017</a:t>
             </a:fld>
             <a:endParaRPr lang="en-AU"/>
           </a:p>
@@ -1769,7 +1773,7 @@
             <a:fld id="{1585DAA5-6BE2-467A-90B2-00E985D86198}" type="datetimeFigureOut">
               <a:rPr lang="en-AU" smtClean="0"/>
               <a:pPr/>
-              <a:t>9/03/2017</a:t>
+              <a:t>12/03/2017</a:t>
             </a:fld>
             <a:endParaRPr lang="en-AU"/>
           </a:p>
@@ -1884,7 +1888,7 @@
             <a:fld id="{1585DAA5-6BE2-467A-90B2-00E985D86198}" type="datetimeFigureOut">
               <a:rPr lang="en-AU" smtClean="0"/>
               <a:pPr/>
-              <a:t>9/03/2017</a:t>
+              <a:t>12/03/2017</a:t>
             </a:fld>
             <a:endParaRPr lang="en-AU"/>
           </a:p>
@@ -1976,7 +1980,7 @@
             <a:fld id="{1585DAA5-6BE2-467A-90B2-00E985D86198}" type="datetimeFigureOut">
               <a:rPr lang="en-AU" smtClean="0"/>
               <a:pPr/>
-              <a:t>9/03/2017</a:t>
+              <a:t>12/03/2017</a:t>
             </a:fld>
             <a:endParaRPr lang="en-AU"/>
           </a:p>
@@ -2250,7 +2254,7 @@
             <a:fld id="{1585DAA5-6BE2-467A-90B2-00E985D86198}" type="datetimeFigureOut">
               <a:rPr lang="en-AU" smtClean="0"/>
               <a:pPr/>
-              <a:t>9/03/2017</a:t>
+              <a:t>12/03/2017</a:t>
             </a:fld>
             <a:endParaRPr lang="en-AU"/>
           </a:p>
@@ -2500,7 +2504,7 @@
             <a:fld id="{1585DAA5-6BE2-467A-90B2-00E985D86198}" type="datetimeFigureOut">
               <a:rPr lang="en-AU" smtClean="0"/>
               <a:pPr/>
-              <a:t>9/03/2017</a:t>
+              <a:t>12/03/2017</a:t>
             </a:fld>
             <a:endParaRPr lang="en-AU"/>
           </a:p>
@@ -2710,7 +2714,7 @@
             <a:fld id="{1585DAA5-6BE2-467A-90B2-00E985D86198}" type="datetimeFigureOut">
               <a:rPr lang="en-AU" smtClean="0"/>
               <a:pPr/>
-              <a:t>9/03/2017</a:t>
+              <a:t>12/03/2017</a:t>
             </a:fld>
             <a:endParaRPr lang="en-AU"/>
           </a:p>
@@ -3194,6 +3198,1115 @@
 </p:sld>
 </file>
 
+<file path=ppt/slides/slide10.xml><?xml version="1.0" encoding="utf-8"?>
+<p:sld xmlns:a="http://schemas.openxmlformats.org/drawingml/2006/main" xmlns:r="http://schemas.openxmlformats.org/officeDocument/2006/relationships" xmlns:p="http://schemas.openxmlformats.org/presentationml/2006/main">
+  <p:cSld>
+    <p:spTree>
+      <p:nvGrpSpPr>
+        <p:cNvPr id="1" name=""/>
+        <p:cNvGrpSpPr/>
+        <p:nvPr/>
+      </p:nvGrpSpPr>
+      <p:grpSpPr>
+        <a:xfrm>
+          <a:off x="0" y="0"/>
+          <a:ext cx="0" cy="0"/>
+          <a:chOff x="0" y="0"/>
+          <a:chExt cx="0" cy="0"/>
+        </a:xfrm>
+      </p:grpSpPr>
+      <p:sp>
+        <p:nvSpPr>
+          <p:cNvPr id="4" name="Rectangle 3"/>
+          <p:cNvSpPr/>
+          <p:nvPr/>
+        </p:nvSpPr>
+        <p:spPr>
+          <a:xfrm>
+            <a:off x="39153" y="109410"/>
+            <a:ext cx="720000" cy="540000"/>
+          </a:xfrm>
+          <a:prstGeom prst="rect">
+            <a:avLst/>
+          </a:prstGeom>
+          <a:solidFill>
+            <a:schemeClr val="accent1">
+              <a:lumMod val="40000"/>
+              <a:lumOff val="60000"/>
+            </a:schemeClr>
+          </a:solidFill>
+          <a:ln>
+            <a:solidFill>
+              <a:schemeClr val="accent1">
+                <a:lumMod val="50000"/>
+              </a:schemeClr>
+            </a:solidFill>
+          </a:ln>
+        </p:spPr>
+        <p:style>
+          <a:lnRef idx="2">
+            <a:schemeClr val="accent1">
+              <a:shade val="50000"/>
+            </a:schemeClr>
+          </a:lnRef>
+          <a:fillRef idx="1">
+            <a:schemeClr val="accent1"/>
+          </a:fillRef>
+          <a:effectRef idx="0">
+            <a:schemeClr val="accent1"/>
+          </a:effectRef>
+          <a:fontRef idx="minor">
+            <a:schemeClr val="lt1"/>
+          </a:fontRef>
+        </p:style>
+        <p:txBody>
+          <a:bodyPr wrap="square" lIns="0" rIns="0" rtlCol="0" anchor="ctr"/>
+          <a:lstStyle/>
+          <a:p>
+            <a:pPr algn="ctr"/>
+            <a:r>
+              <a:rPr lang="en-US" sz="2000" dirty="0">
+                <a:solidFill>
+                  <a:schemeClr val="tx1"/>
+                </a:solidFill>
+              </a:rPr>
+              <a:t>8</a:t>
+            </a:r>
+            <a:endParaRPr lang="en-AU" sz="2000" dirty="0">
+              <a:solidFill>
+                <a:schemeClr val="tx1"/>
+              </a:solidFill>
+            </a:endParaRPr>
+          </a:p>
+        </p:txBody>
+      </p:sp>
+      <p:sp>
+        <p:nvSpPr>
+          <p:cNvPr id="6" name="Rectangle 5"/>
+          <p:cNvSpPr/>
+          <p:nvPr/>
+        </p:nvSpPr>
+        <p:spPr>
+          <a:xfrm>
+            <a:off x="831153" y="109410"/>
+            <a:ext cx="7380000" cy="540000"/>
+          </a:xfrm>
+          <a:prstGeom prst="rect">
+            <a:avLst/>
+          </a:prstGeom>
+          <a:ln>
+            <a:solidFill>
+              <a:schemeClr val="accent1">
+                <a:lumMod val="50000"/>
+              </a:schemeClr>
+            </a:solidFill>
+          </a:ln>
+        </p:spPr>
+        <p:style>
+          <a:lnRef idx="2">
+            <a:schemeClr val="accent1">
+              <a:shade val="50000"/>
+            </a:schemeClr>
+          </a:lnRef>
+          <a:fillRef idx="1">
+            <a:schemeClr val="accent1"/>
+          </a:fillRef>
+          <a:effectRef idx="0">
+            <a:schemeClr val="accent1"/>
+          </a:effectRef>
+          <a:fontRef idx="minor">
+            <a:schemeClr val="lt1"/>
+          </a:fontRef>
+        </p:style>
+        <p:txBody>
+          <a:bodyPr rtlCol="0" anchor="ctr"/>
+          <a:lstStyle/>
+          <a:p>
+            <a:pPr algn="ctr"/>
+            <a:r>
+              <a:rPr lang="en-AU" sz="2800" dirty="0" smtClean="0"/>
+              <a:t>Tenant sign-up</a:t>
+            </a:r>
+            <a:endParaRPr lang="en-AU" sz="2800" dirty="0"/>
+          </a:p>
+        </p:txBody>
+      </p:sp>
+      <p:sp>
+        <p:nvSpPr>
+          <p:cNvPr id="7" name="Rectangle 6"/>
+          <p:cNvSpPr/>
+          <p:nvPr/>
+        </p:nvSpPr>
+        <p:spPr>
+          <a:xfrm>
+            <a:off x="0" y="822470"/>
+            <a:ext cx="9828000" cy="2340000"/>
+          </a:xfrm>
+          <a:prstGeom prst="rect">
+            <a:avLst/>
+          </a:prstGeom>
+          <a:solidFill>
+            <a:schemeClr val="tx2">
+              <a:lumMod val="20000"/>
+              <a:lumOff val="80000"/>
+            </a:schemeClr>
+          </a:solidFill>
+          <a:ln>
+            <a:solidFill>
+              <a:schemeClr val="accent1">
+                <a:lumMod val="50000"/>
+              </a:schemeClr>
+            </a:solidFill>
+          </a:ln>
+        </p:spPr>
+        <p:style>
+          <a:lnRef idx="2">
+            <a:schemeClr val="accent1">
+              <a:shade val="50000"/>
+            </a:schemeClr>
+          </a:lnRef>
+          <a:fillRef idx="1">
+            <a:schemeClr val="accent1"/>
+          </a:fillRef>
+          <a:effectRef idx="0">
+            <a:schemeClr val="accent1"/>
+          </a:effectRef>
+          <a:fontRef idx="minor">
+            <a:schemeClr val="lt1"/>
+          </a:fontRef>
+        </p:style>
+        <p:txBody>
+          <a:bodyPr rtlCol="0" anchor="t" anchorCtr="0"/>
+          <a:lstStyle/>
+          <a:p>
+            <a:r>
+              <a:rPr lang="en-US" sz="2400" dirty="0">
+                <a:solidFill>
+                  <a:schemeClr val="tx1"/>
+                </a:solidFill>
+              </a:rPr>
+              <a:t>As a prospective tenant, I want to be able to sign up to the website, so that I can view properties.</a:t>
+            </a:r>
+            <a:endParaRPr lang="en-AU" sz="2400" dirty="0">
+              <a:solidFill>
+                <a:schemeClr val="tx1"/>
+              </a:solidFill>
+            </a:endParaRPr>
+          </a:p>
+        </p:txBody>
+      </p:sp>
+      <p:sp>
+        <p:nvSpPr>
+          <p:cNvPr id="8" name="Rectangle 7"/>
+          <p:cNvSpPr/>
+          <p:nvPr/>
+        </p:nvSpPr>
+        <p:spPr>
+          <a:xfrm>
+            <a:off x="39153" y="3335530"/>
+            <a:ext cx="9828000" cy="1620000"/>
+          </a:xfrm>
+          <a:prstGeom prst="rect">
+            <a:avLst/>
+          </a:prstGeom>
+          <a:solidFill>
+            <a:schemeClr val="accent1">
+              <a:lumMod val="20000"/>
+              <a:lumOff val="80000"/>
+            </a:schemeClr>
+          </a:solidFill>
+          <a:ln>
+            <a:solidFill>
+              <a:schemeClr val="accent1">
+                <a:lumMod val="50000"/>
+              </a:schemeClr>
+            </a:solidFill>
+          </a:ln>
+        </p:spPr>
+        <p:style>
+          <a:lnRef idx="2">
+            <a:schemeClr val="accent1">
+              <a:shade val="50000"/>
+            </a:schemeClr>
+          </a:lnRef>
+          <a:fillRef idx="1">
+            <a:schemeClr val="accent1"/>
+          </a:fillRef>
+          <a:effectRef idx="0">
+            <a:schemeClr val="accent1"/>
+          </a:effectRef>
+          <a:fontRef idx="minor">
+            <a:schemeClr val="lt1"/>
+          </a:fontRef>
+        </p:style>
+        <p:txBody>
+          <a:bodyPr tIns="36000" rtlCol="0" anchor="t" anchorCtr="0"/>
+          <a:lstStyle/>
+          <a:p>
+            <a:r>
+              <a:rPr lang="en-AU" sz="2000" dirty="0">
+                <a:solidFill>
+                  <a:schemeClr val="tx1"/>
+                </a:solidFill>
+              </a:rPr>
+              <a:t>Acceptance Criteria</a:t>
+            </a:r>
+          </a:p>
+          <a:p>
+            <a:pPr marL="179388" indent="-179388">
+              <a:buFont typeface="Arial" pitchFamily="34" charset="0"/>
+              <a:buChar char="•"/>
+            </a:pPr>
+            <a:r>
+              <a:rPr lang="en-AU" sz="2000" dirty="0">
+                <a:solidFill>
+                  <a:schemeClr val="tx1"/>
+                </a:solidFill>
+              </a:rPr>
+              <a:t> </a:t>
+            </a:r>
+            <a:r>
+              <a:rPr lang="en-AU" sz="2000" dirty="0">
+                <a:solidFill>
+                  <a:schemeClr val="tx1"/>
+                </a:solidFill>
+              </a:rPr>
+              <a:t>Does the register link work?</a:t>
+            </a:r>
+          </a:p>
+          <a:p>
+            <a:pPr marL="179388" indent="-179388">
+              <a:buFont typeface="Arial" pitchFamily="34" charset="0"/>
+              <a:buChar char="•"/>
+            </a:pPr>
+            <a:r>
+              <a:rPr lang="en-US" sz="2000" dirty="0">
+                <a:solidFill>
+                  <a:schemeClr val="tx1"/>
+                </a:solidFill>
+              </a:rPr>
+              <a:t>Are the details saved correctly?</a:t>
+            </a:r>
+          </a:p>
+          <a:p>
+            <a:pPr marL="179388" indent="-179388">
+              <a:buFont typeface="Arial" pitchFamily="34" charset="0"/>
+              <a:buChar char="•"/>
+            </a:pPr>
+            <a:r>
+              <a:rPr lang="en-US" sz="2000" dirty="0">
+                <a:solidFill>
+                  <a:schemeClr val="tx1"/>
+                </a:solidFill>
+              </a:rPr>
+              <a:t>Does the prospective tenant </a:t>
+            </a:r>
+            <a:r>
+              <a:rPr lang="en-US" sz="2000" dirty="0" smtClean="0">
+                <a:solidFill>
+                  <a:schemeClr val="tx1"/>
+                </a:solidFill>
+              </a:rPr>
+              <a:t>have </a:t>
+            </a:r>
+            <a:r>
+              <a:rPr lang="en-US" sz="2000" dirty="0">
+                <a:solidFill>
+                  <a:schemeClr val="tx1"/>
+                </a:solidFill>
+              </a:rPr>
+              <a:t>access to </a:t>
+            </a:r>
+            <a:r>
+              <a:rPr lang="en-US" sz="2000" dirty="0" smtClean="0">
+                <a:solidFill>
+                  <a:schemeClr val="tx1"/>
+                </a:solidFill>
+              </a:rPr>
+              <a:t>view properties?</a:t>
+            </a:r>
+            <a:endParaRPr lang="en-AU" sz="2000" dirty="0">
+              <a:solidFill>
+                <a:schemeClr val="tx1"/>
+              </a:solidFill>
+            </a:endParaRPr>
+          </a:p>
+        </p:txBody>
+      </p:sp>
+      <p:sp>
+        <p:nvSpPr>
+          <p:cNvPr id="11" name="Rectangle 10"/>
+          <p:cNvSpPr/>
+          <p:nvPr/>
+        </p:nvSpPr>
+        <p:spPr>
+          <a:xfrm>
+            <a:off x="9147153" y="109410"/>
+            <a:ext cx="720000" cy="540000"/>
+          </a:xfrm>
+          <a:prstGeom prst="rect">
+            <a:avLst/>
+          </a:prstGeom>
+          <a:solidFill>
+            <a:srgbClr val="CCF0CD">
+              <a:alpha val="20000"/>
+            </a:srgbClr>
+          </a:solidFill>
+          <a:ln>
+            <a:solidFill>
+              <a:schemeClr val="accent1">
+                <a:lumMod val="50000"/>
+              </a:schemeClr>
+            </a:solidFill>
+          </a:ln>
+        </p:spPr>
+        <p:style>
+          <a:lnRef idx="2">
+            <a:schemeClr val="accent1">
+              <a:shade val="50000"/>
+            </a:schemeClr>
+          </a:lnRef>
+          <a:fillRef idx="1">
+            <a:schemeClr val="accent1"/>
+          </a:fillRef>
+          <a:effectRef idx="0">
+            <a:schemeClr val="accent1"/>
+          </a:effectRef>
+          <a:fontRef idx="minor">
+            <a:schemeClr val="lt1"/>
+          </a:fontRef>
+        </p:style>
+        <p:txBody>
+          <a:bodyPr wrap="square" lIns="0" rIns="0" rtlCol="0" anchor="ctr"/>
+          <a:lstStyle/>
+          <a:p>
+            <a:pPr algn="ctr"/>
+            <a:r>
+              <a:rPr lang="en-AU" sz="2000" dirty="0">
+                <a:solidFill>
+                  <a:schemeClr val="tx1"/>
+                </a:solidFill>
+              </a:rPr>
+              <a:t>Story Points</a:t>
+            </a:r>
+          </a:p>
+        </p:txBody>
+      </p:sp>
+      <p:sp>
+        <p:nvSpPr>
+          <p:cNvPr id="12" name="Rectangle 11"/>
+          <p:cNvSpPr/>
+          <p:nvPr/>
+        </p:nvSpPr>
+        <p:spPr>
+          <a:xfrm>
+            <a:off x="8283153" y="109410"/>
+            <a:ext cx="792000" cy="540000"/>
+          </a:xfrm>
+          <a:prstGeom prst="rect">
+            <a:avLst/>
+          </a:prstGeom>
+          <a:solidFill>
+            <a:schemeClr val="accent4">
+              <a:lumMod val="20000"/>
+              <a:lumOff val="80000"/>
+            </a:schemeClr>
+          </a:solidFill>
+          <a:ln>
+            <a:solidFill>
+              <a:schemeClr val="accent1">
+                <a:lumMod val="50000"/>
+              </a:schemeClr>
+            </a:solidFill>
+          </a:ln>
+        </p:spPr>
+        <p:style>
+          <a:lnRef idx="2">
+            <a:schemeClr val="accent1">
+              <a:shade val="50000"/>
+            </a:schemeClr>
+          </a:lnRef>
+          <a:fillRef idx="1">
+            <a:schemeClr val="accent1"/>
+          </a:fillRef>
+          <a:effectRef idx="0">
+            <a:schemeClr val="accent1"/>
+          </a:effectRef>
+          <a:fontRef idx="minor">
+            <a:schemeClr val="lt1"/>
+          </a:fontRef>
+        </p:style>
+        <p:txBody>
+          <a:bodyPr wrap="none" lIns="0" rIns="0" rtlCol="0" anchor="ctr"/>
+          <a:lstStyle/>
+          <a:p>
+            <a:pPr algn="ctr"/>
+            <a:r>
+              <a:rPr lang="en-AU" sz="2000" dirty="0">
+                <a:solidFill>
+                  <a:schemeClr val="tx1"/>
+                </a:solidFill>
+              </a:rPr>
+              <a:t>HIGH</a:t>
+            </a:r>
+          </a:p>
+        </p:txBody>
+      </p:sp>
+      <p:sp>
+        <p:nvSpPr>
+          <p:cNvPr id="13" name="Rectangle 12"/>
+          <p:cNvSpPr/>
+          <p:nvPr/>
+        </p:nvSpPr>
+        <p:spPr>
+          <a:xfrm>
+            <a:off x="39153" y="5128590"/>
+            <a:ext cx="9828000" cy="1620000"/>
+          </a:xfrm>
+          <a:prstGeom prst="rect">
+            <a:avLst/>
+          </a:prstGeom>
+          <a:solidFill>
+            <a:schemeClr val="bg1"/>
+          </a:solidFill>
+          <a:ln>
+            <a:solidFill>
+              <a:schemeClr val="accent1">
+                <a:lumMod val="50000"/>
+              </a:schemeClr>
+            </a:solidFill>
+          </a:ln>
+        </p:spPr>
+        <p:style>
+          <a:lnRef idx="2">
+            <a:schemeClr val="accent1">
+              <a:shade val="50000"/>
+            </a:schemeClr>
+          </a:lnRef>
+          <a:fillRef idx="1">
+            <a:schemeClr val="accent1"/>
+          </a:fillRef>
+          <a:effectRef idx="0">
+            <a:schemeClr val="accent1"/>
+          </a:effectRef>
+          <a:fontRef idx="minor">
+            <a:schemeClr val="lt1"/>
+          </a:fontRef>
+        </p:style>
+        <p:txBody>
+          <a:bodyPr tIns="36000" rtlCol="0" anchor="t" anchorCtr="0"/>
+          <a:lstStyle/>
+          <a:p>
+            <a:r>
+              <a:rPr lang="en-AU" sz="2000" dirty="0">
+                <a:solidFill>
+                  <a:schemeClr val="tx1"/>
+                </a:solidFill>
+              </a:rPr>
+              <a:t>Notes</a:t>
+            </a:r>
+          </a:p>
+          <a:p>
+            <a:pPr marL="179388" indent="-179388">
+              <a:buFont typeface="Arial" pitchFamily="34" charset="0"/>
+              <a:buChar char="•"/>
+            </a:pPr>
+            <a:r>
+              <a:rPr lang="en-AU" sz="2000" dirty="0">
+                <a:solidFill>
+                  <a:schemeClr val="tx1"/>
+                </a:solidFill>
+              </a:rPr>
+              <a:t> </a:t>
+            </a:r>
+            <a:r>
+              <a:rPr lang="en-AU" sz="2000" dirty="0" smtClean="0">
+                <a:solidFill>
+                  <a:schemeClr val="tx1"/>
+                </a:solidFill>
+              </a:rPr>
+              <a:t>Similar to 8a, just needs differing access levels &amp; anyone can add themselves.</a:t>
+            </a:r>
+            <a:endParaRPr lang="en-AU" sz="2000" dirty="0">
+              <a:solidFill>
+                <a:schemeClr val="tx1"/>
+              </a:solidFill>
+            </a:endParaRPr>
+          </a:p>
+        </p:txBody>
+      </p:sp>
+    </p:spTree>
+    <p:extLst>
+      <p:ext uri="{BB962C8B-B14F-4D97-AF65-F5344CB8AC3E}">
+        <p14:creationId xmlns:p14="http://schemas.microsoft.com/office/powerpoint/2010/main" val="1423214942"/>
+      </p:ext>
+    </p:extLst>
+  </p:cSld>
+  <p:clrMapOvr>
+    <a:masterClrMapping/>
+  </p:clrMapOvr>
+</p:sld>
+</file>
+
+<file path=ppt/slides/slide11.xml><?xml version="1.0" encoding="utf-8"?>
+<p:sld xmlns:a="http://schemas.openxmlformats.org/drawingml/2006/main" xmlns:r="http://schemas.openxmlformats.org/officeDocument/2006/relationships" xmlns:p="http://schemas.openxmlformats.org/presentationml/2006/main">
+  <p:cSld>
+    <p:spTree>
+      <p:nvGrpSpPr>
+        <p:cNvPr id="1" name=""/>
+        <p:cNvGrpSpPr/>
+        <p:nvPr/>
+      </p:nvGrpSpPr>
+      <p:grpSpPr>
+        <a:xfrm>
+          <a:off x="0" y="0"/>
+          <a:ext cx="0" cy="0"/>
+          <a:chOff x="0" y="0"/>
+          <a:chExt cx="0" cy="0"/>
+        </a:xfrm>
+      </p:grpSpPr>
+      <p:sp>
+        <p:nvSpPr>
+          <p:cNvPr id="4" name="Rectangle 3"/>
+          <p:cNvSpPr/>
+          <p:nvPr/>
+        </p:nvSpPr>
+        <p:spPr>
+          <a:xfrm>
+            <a:off x="39153" y="109410"/>
+            <a:ext cx="720000" cy="540000"/>
+          </a:xfrm>
+          <a:prstGeom prst="rect">
+            <a:avLst/>
+          </a:prstGeom>
+          <a:solidFill>
+            <a:schemeClr val="accent1">
+              <a:lumMod val="40000"/>
+              <a:lumOff val="60000"/>
+            </a:schemeClr>
+          </a:solidFill>
+          <a:ln>
+            <a:solidFill>
+              <a:schemeClr val="accent1">
+                <a:lumMod val="50000"/>
+              </a:schemeClr>
+            </a:solidFill>
+          </a:ln>
+        </p:spPr>
+        <p:style>
+          <a:lnRef idx="2">
+            <a:schemeClr val="accent1">
+              <a:shade val="50000"/>
+            </a:schemeClr>
+          </a:lnRef>
+          <a:fillRef idx="1">
+            <a:schemeClr val="accent1"/>
+          </a:fillRef>
+          <a:effectRef idx="0">
+            <a:schemeClr val="accent1"/>
+          </a:effectRef>
+          <a:fontRef idx="minor">
+            <a:schemeClr val="lt1"/>
+          </a:fontRef>
+        </p:style>
+        <p:txBody>
+          <a:bodyPr wrap="square" lIns="0" rIns="0" rtlCol="0" anchor="ctr"/>
+          <a:lstStyle/>
+          <a:p>
+            <a:pPr algn="ctr"/>
+            <a:r>
+              <a:rPr lang="en-US" sz="2000" dirty="0" smtClean="0">
+                <a:solidFill>
+                  <a:schemeClr val="tx1"/>
+                </a:solidFill>
+              </a:rPr>
+              <a:t>8a</a:t>
+            </a:r>
+            <a:endParaRPr lang="en-AU" sz="2000" dirty="0">
+              <a:solidFill>
+                <a:schemeClr val="tx1"/>
+              </a:solidFill>
+            </a:endParaRPr>
+          </a:p>
+        </p:txBody>
+      </p:sp>
+      <p:sp>
+        <p:nvSpPr>
+          <p:cNvPr id="6" name="Rectangle 5"/>
+          <p:cNvSpPr/>
+          <p:nvPr/>
+        </p:nvSpPr>
+        <p:spPr>
+          <a:xfrm>
+            <a:off x="831153" y="109410"/>
+            <a:ext cx="7380000" cy="540000"/>
+          </a:xfrm>
+          <a:prstGeom prst="rect">
+            <a:avLst/>
+          </a:prstGeom>
+          <a:ln>
+            <a:solidFill>
+              <a:schemeClr val="accent1">
+                <a:lumMod val="50000"/>
+              </a:schemeClr>
+            </a:solidFill>
+          </a:ln>
+        </p:spPr>
+        <p:style>
+          <a:lnRef idx="2">
+            <a:schemeClr val="accent1">
+              <a:shade val="50000"/>
+            </a:schemeClr>
+          </a:lnRef>
+          <a:fillRef idx="1">
+            <a:schemeClr val="accent1"/>
+          </a:fillRef>
+          <a:effectRef idx="0">
+            <a:schemeClr val="accent1"/>
+          </a:effectRef>
+          <a:fontRef idx="minor">
+            <a:schemeClr val="lt1"/>
+          </a:fontRef>
+        </p:style>
+        <p:txBody>
+          <a:bodyPr rtlCol="0" anchor="ctr"/>
+          <a:lstStyle/>
+          <a:p>
+            <a:pPr algn="ctr"/>
+            <a:r>
+              <a:rPr lang="en-AU" sz="2800" dirty="0" smtClean="0"/>
+              <a:t>Staff Sign-up</a:t>
+            </a:r>
+            <a:endParaRPr lang="en-AU" sz="2800" dirty="0"/>
+          </a:p>
+        </p:txBody>
+      </p:sp>
+      <p:sp>
+        <p:nvSpPr>
+          <p:cNvPr id="7" name="Rectangle 6"/>
+          <p:cNvSpPr/>
+          <p:nvPr/>
+        </p:nvSpPr>
+        <p:spPr>
+          <a:xfrm>
+            <a:off x="0" y="822470"/>
+            <a:ext cx="9828000" cy="2340000"/>
+          </a:xfrm>
+          <a:prstGeom prst="rect">
+            <a:avLst/>
+          </a:prstGeom>
+          <a:solidFill>
+            <a:schemeClr val="tx2">
+              <a:lumMod val="20000"/>
+              <a:lumOff val="80000"/>
+            </a:schemeClr>
+          </a:solidFill>
+          <a:ln>
+            <a:solidFill>
+              <a:schemeClr val="accent1">
+                <a:lumMod val="50000"/>
+              </a:schemeClr>
+            </a:solidFill>
+          </a:ln>
+        </p:spPr>
+        <p:style>
+          <a:lnRef idx="2">
+            <a:schemeClr val="accent1">
+              <a:shade val="50000"/>
+            </a:schemeClr>
+          </a:lnRef>
+          <a:fillRef idx="1">
+            <a:schemeClr val="accent1"/>
+          </a:fillRef>
+          <a:effectRef idx="0">
+            <a:schemeClr val="accent1"/>
+          </a:effectRef>
+          <a:fontRef idx="minor">
+            <a:schemeClr val="lt1"/>
+          </a:fontRef>
+        </p:style>
+        <p:txBody>
+          <a:bodyPr rtlCol="0" anchor="t" anchorCtr="0"/>
+          <a:lstStyle/>
+          <a:p>
+            <a:r>
+              <a:rPr lang="en-US" sz="2400" dirty="0">
+                <a:solidFill>
+                  <a:schemeClr val="tx1"/>
+                </a:solidFill>
+              </a:rPr>
+              <a:t>As a staff member, I want to be able to sign up to the website, so that I can view the prospective tenants details.</a:t>
+            </a:r>
+            <a:endParaRPr lang="en-AU" sz="2400" dirty="0">
+              <a:solidFill>
+                <a:schemeClr val="tx1"/>
+              </a:solidFill>
+            </a:endParaRPr>
+          </a:p>
+        </p:txBody>
+      </p:sp>
+      <p:sp>
+        <p:nvSpPr>
+          <p:cNvPr id="8" name="Rectangle 7"/>
+          <p:cNvSpPr/>
+          <p:nvPr/>
+        </p:nvSpPr>
+        <p:spPr>
+          <a:xfrm>
+            <a:off x="39153" y="3335530"/>
+            <a:ext cx="9828000" cy="1620000"/>
+          </a:xfrm>
+          <a:prstGeom prst="rect">
+            <a:avLst/>
+          </a:prstGeom>
+          <a:solidFill>
+            <a:schemeClr val="accent1">
+              <a:lumMod val="20000"/>
+              <a:lumOff val="80000"/>
+            </a:schemeClr>
+          </a:solidFill>
+          <a:ln>
+            <a:solidFill>
+              <a:schemeClr val="accent1">
+                <a:lumMod val="50000"/>
+              </a:schemeClr>
+            </a:solidFill>
+          </a:ln>
+        </p:spPr>
+        <p:style>
+          <a:lnRef idx="2">
+            <a:schemeClr val="accent1">
+              <a:shade val="50000"/>
+            </a:schemeClr>
+          </a:lnRef>
+          <a:fillRef idx="1">
+            <a:schemeClr val="accent1"/>
+          </a:fillRef>
+          <a:effectRef idx="0">
+            <a:schemeClr val="accent1"/>
+          </a:effectRef>
+          <a:fontRef idx="minor">
+            <a:schemeClr val="lt1"/>
+          </a:fontRef>
+        </p:style>
+        <p:txBody>
+          <a:bodyPr tIns="36000" rtlCol="0" anchor="t" anchorCtr="0"/>
+          <a:lstStyle/>
+          <a:p>
+            <a:r>
+              <a:rPr lang="en-AU" sz="2000" dirty="0">
+                <a:solidFill>
+                  <a:schemeClr val="tx1"/>
+                </a:solidFill>
+              </a:rPr>
+              <a:t>Acceptance Criteria</a:t>
+            </a:r>
+          </a:p>
+          <a:p>
+            <a:pPr marL="179388" indent="-179388">
+              <a:buFont typeface="Arial" pitchFamily="34" charset="0"/>
+              <a:buChar char="•"/>
+            </a:pPr>
+            <a:r>
+              <a:rPr lang="en-AU" sz="2000" dirty="0" smtClean="0">
+                <a:solidFill>
+                  <a:schemeClr val="tx1"/>
+                </a:solidFill>
+              </a:rPr>
+              <a:t>Is David able to add staff?</a:t>
+            </a:r>
+            <a:endParaRPr lang="en-AU" sz="2000" dirty="0">
+              <a:solidFill>
+                <a:schemeClr val="tx1"/>
+              </a:solidFill>
+            </a:endParaRPr>
+          </a:p>
+          <a:p>
+            <a:pPr marL="179388" indent="-179388">
+              <a:buFont typeface="Arial" pitchFamily="34" charset="0"/>
+              <a:buChar char="•"/>
+            </a:pPr>
+            <a:r>
+              <a:rPr lang="en-US" sz="2000" dirty="0" smtClean="0">
+                <a:solidFill>
+                  <a:schemeClr val="tx1"/>
+                </a:solidFill>
+              </a:rPr>
+              <a:t>Are the details saved correctly?</a:t>
+            </a:r>
+            <a:endParaRPr lang="en-US" sz="2000" dirty="0">
+              <a:solidFill>
+                <a:schemeClr val="tx1"/>
+              </a:solidFill>
+            </a:endParaRPr>
+          </a:p>
+          <a:p>
+            <a:pPr marL="179388" indent="-179388">
+              <a:buFont typeface="Arial" pitchFamily="34" charset="0"/>
+              <a:buChar char="•"/>
+            </a:pPr>
+            <a:r>
+              <a:rPr lang="en-US" sz="2000" dirty="0" smtClean="0">
+                <a:solidFill>
+                  <a:schemeClr val="tx1"/>
+                </a:solidFill>
+              </a:rPr>
+              <a:t>Does the staff member have access to the relevant details?</a:t>
+            </a:r>
+            <a:endParaRPr lang="en-AU" sz="2000" dirty="0">
+              <a:solidFill>
+                <a:schemeClr val="tx1"/>
+              </a:solidFill>
+            </a:endParaRPr>
+          </a:p>
+        </p:txBody>
+      </p:sp>
+      <p:sp>
+        <p:nvSpPr>
+          <p:cNvPr id="11" name="Rectangle 10"/>
+          <p:cNvSpPr/>
+          <p:nvPr/>
+        </p:nvSpPr>
+        <p:spPr>
+          <a:xfrm>
+            <a:off x="9147153" y="109410"/>
+            <a:ext cx="720000" cy="540000"/>
+          </a:xfrm>
+          <a:prstGeom prst="rect">
+            <a:avLst/>
+          </a:prstGeom>
+          <a:solidFill>
+            <a:srgbClr val="CCF0CD">
+              <a:alpha val="20000"/>
+            </a:srgbClr>
+          </a:solidFill>
+          <a:ln>
+            <a:solidFill>
+              <a:schemeClr val="accent1">
+                <a:lumMod val="50000"/>
+              </a:schemeClr>
+            </a:solidFill>
+          </a:ln>
+        </p:spPr>
+        <p:style>
+          <a:lnRef idx="2">
+            <a:schemeClr val="accent1">
+              <a:shade val="50000"/>
+            </a:schemeClr>
+          </a:lnRef>
+          <a:fillRef idx="1">
+            <a:schemeClr val="accent1"/>
+          </a:fillRef>
+          <a:effectRef idx="0">
+            <a:schemeClr val="accent1"/>
+          </a:effectRef>
+          <a:fontRef idx="minor">
+            <a:schemeClr val="lt1"/>
+          </a:fontRef>
+        </p:style>
+        <p:txBody>
+          <a:bodyPr wrap="square" lIns="0" rIns="0" rtlCol="0" anchor="ctr"/>
+          <a:lstStyle/>
+          <a:p>
+            <a:pPr algn="ctr"/>
+            <a:r>
+              <a:rPr lang="en-AU" sz="2000" dirty="0">
+                <a:solidFill>
+                  <a:schemeClr val="tx1"/>
+                </a:solidFill>
+              </a:rPr>
+              <a:t>Story Points</a:t>
+            </a:r>
+          </a:p>
+        </p:txBody>
+      </p:sp>
+      <p:sp>
+        <p:nvSpPr>
+          <p:cNvPr id="12" name="Rectangle 11"/>
+          <p:cNvSpPr/>
+          <p:nvPr/>
+        </p:nvSpPr>
+        <p:spPr>
+          <a:xfrm>
+            <a:off x="8283153" y="109410"/>
+            <a:ext cx="792000" cy="540000"/>
+          </a:xfrm>
+          <a:prstGeom prst="rect">
+            <a:avLst/>
+          </a:prstGeom>
+          <a:solidFill>
+            <a:schemeClr val="accent4">
+              <a:lumMod val="20000"/>
+              <a:lumOff val="80000"/>
+            </a:schemeClr>
+          </a:solidFill>
+          <a:ln>
+            <a:solidFill>
+              <a:schemeClr val="accent1">
+                <a:lumMod val="50000"/>
+              </a:schemeClr>
+            </a:solidFill>
+          </a:ln>
+        </p:spPr>
+        <p:style>
+          <a:lnRef idx="2">
+            <a:schemeClr val="accent1">
+              <a:shade val="50000"/>
+            </a:schemeClr>
+          </a:lnRef>
+          <a:fillRef idx="1">
+            <a:schemeClr val="accent1"/>
+          </a:fillRef>
+          <a:effectRef idx="0">
+            <a:schemeClr val="accent1"/>
+          </a:effectRef>
+          <a:fontRef idx="minor">
+            <a:schemeClr val="lt1"/>
+          </a:fontRef>
+        </p:style>
+        <p:txBody>
+          <a:bodyPr wrap="none" lIns="0" rIns="0" rtlCol="0" anchor="ctr"/>
+          <a:lstStyle/>
+          <a:p>
+            <a:pPr algn="ctr"/>
+            <a:r>
+              <a:rPr lang="en-AU" sz="2000" dirty="0">
+                <a:solidFill>
+                  <a:schemeClr val="tx1"/>
+                </a:solidFill>
+              </a:rPr>
+              <a:t>HIGH</a:t>
+            </a:r>
+          </a:p>
+        </p:txBody>
+      </p:sp>
+      <p:sp>
+        <p:nvSpPr>
+          <p:cNvPr id="13" name="Rectangle 12"/>
+          <p:cNvSpPr/>
+          <p:nvPr/>
+        </p:nvSpPr>
+        <p:spPr>
+          <a:xfrm>
+            <a:off x="39153" y="5128590"/>
+            <a:ext cx="9828000" cy="1620000"/>
+          </a:xfrm>
+          <a:prstGeom prst="rect">
+            <a:avLst/>
+          </a:prstGeom>
+          <a:solidFill>
+            <a:schemeClr val="bg1"/>
+          </a:solidFill>
+          <a:ln>
+            <a:solidFill>
+              <a:schemeClr val="accent1">
+                <a:lumMod val="50000"/>
+              </a:schemeClr>
+            </a:solidFill>
+          </a:ln>
+        </p:spPr>
+        <p:style>
+          <a:lnRef idx="2">
+            <a:schemeClr val="accent1">
+              <a:shade val="50000"/>
+            </a:schemeClr>
+          </a:lnRef>
+          <a:fillRef idx="1">
+            <a:schemeClr val="accent1"/>
+          </a:fillRef>
+          <a:effectRef idx="0">
+            <a:schemeClr val="accent1"/>
+          </a:effectRef>
+          <a:fontRef idx="minor">
+            <a:schemeClr val="lt1"/>
+          </a:fontRef>
+        </p:style>
+        <p:txBody>
+          <a:bodyPr tIns="36000" rtlCol="0" anchor="t" anchorCtr="0"/>
+          <a:lstStyle/>
+          <a:p>
+            <a:r>
+              <a:rPr lang="en-AU" sz="2000" dirty="0">
+                <a:solidFill>
+                  <a:schemeClr val="tx1"/>
+                </a:solidFill>
+              </a:rPr>
+              <a:t>Notes</a:t>
+            </a:r>
+          </a:p>
+          <a:p>
+            <a:pPr marL="179388" indent="-179388">
+              <a:buFont typeface="Arial" pitchFamily="34" charset="0"/>
+              <a:buChar char="•"/>
+            </a:pPr>
+            <a:r>
+              <a:rPr lang="en-AU" sz="2000" dirty="0">
+                <a:solidFill>
+                  <a:schemeClr val="tx1"/>
+                </a:solidFill>
+              </a:rPr>
+              <a:t> </a:t>
+            </a:r>
+            <a:r>
+              <a:rPr lang="en-AU" sz="2000" dirty="0">
+                <a:solidFill>
+                  <a:schemeClr val="tx1"/>
+                </a:solidFill>
+              </a:rPr>
+              <a:t>Similar to </a:t>
+            </a:r>
+            <a:r>
+              <a:rPr lang="en-AU" sz="2000" dirty="0" smtClean="0">
+                <a:solidFill>
+                  <a:schemeClr val="tx1"/>
+                </a:solidFill>
+              </a:rPr>
+              <a:t>8, </a:t>
+            </a:r>
+            <a:r>
+              <a:rPr lang="en-AU" sz="2000" dirty="0">
+                <a:solidFill>
+                  <a:schemeClr val="tx1"/>
+                </a:solidFill>
+              </a:rPr>
+              <a:t>just needs differing access </a:t>
+            </a:r>
+            <a:r>
+              <a:rPr lang="en-AU" sz="2000" dirty="0" smtClean="0">
+                <a:solidFill>
+                  <a:schemeClr val="tx1"/>
+                </a:solidFill>
+              </a:rPr>
+              <a:t>levels &amp; only David can add.</a:t>
+            </a:r>
+            <a:endParaRPr lang="en-AU" sz="2000" dirty="0">
+              <a:solidFill>
+                <a:schemeClr val="tx1"/>
+              </a:solidFill>
+            </a:endParaRPr>
+          </a:p>
+          <a:p>
+            <a:endParaRPr lang="en-AU" sz="2000" dirty="0">
+              <a:solidFill>
+                <a:schemeClr val="tx1"/>
+              </a:solidFill>
+            </a:endParaRPr>
+          </a:p>
+        </p:txBody>
+      </p:sp>
+    </p:spTree>
+    <p:extLst>
+      <p:ext uri="{BB962C8B-B14F-4D97-AF65-F5344CB8AC3E}">
+        <p14:creationId xmlns:p14="http://schemas.microsoft.com/office/powerpoint/2010/main" val="798035874"/>
+      </p:ext>
+    </p:extLst>
+  </p:cSld>
+  <p:clrMapOvr>
+    <a:masterClrMapping/>
+  </p:clrMapOvr>
+</p:sld>
+</file>
+
 <file path=ppt/slides/slide2.xml><?xml version="1.0" encoding="utf-8"?>
 <p:sld xmlns:a="http://schemas.openxmlformats.org/drawingml/2006/main" xmlns:r="http://schemas.openxmlformats.org/officeDocument/2006/relationships" xmlns:p="http://schemas.openxmlformats.org/presentationml/2006/main">
   <p:cSld>
@@ -6308,6 +7421,1055 @@
     <p:extLst>
       <p:ext uri="{BB962C8B-B14F-4D97-AF65-F5344CB8AC3E}">
         <p14:creationId xmlns:p14="http://schemas.microsoft.com/office/powerpoint/2010/main" val="2091013506"/>
+      </p:ext>
+    </p:extLst>
+  </p:cSld>
+  <p:clrMapOvr>
+    <a:masterClrMapping/>
+  </p:clrMapOvr>
+</p:sld>
+</file>
+
+<file path=ppt/slides/slide8.xml><?xml version="1.0" encoding="utf-8"?>
+<p:sld xmlns:a="http://schemas.openxmlformats.org/drawingml/2006/main" xmlns:r="http://schemas.openxmlformats.org/officeDocument/2006/relationships" xmlns:p="http://schemas.openxmlformats.org/presentationml/2006/main">
+  <p:cSld>
+    <p:spTree>
+      <p:nvGrpSpPr>
+        <p:cNvPr id="1" name=""/>
+        <p:cNvGrpSpPr/>
+        <p:nvPr/>
+      </p:nvGrpSpPr>
+      <p:grpSpPr>
+        <a:xfrm>
+          <a:off x="0" y="0"/>
+          <a:ext cx="0" cy="0"/>
+          <a:chOff x="0" y="0"/>
+          <a:chExt cx="0" cy="0"/>
+        </a:xfrm>
+      </p:grpSpPr>
+      <p:sp>
+        <p:nvSpPr>
+          <p:cNvPr id="4" name="Rectangle 3"/>
+          <p:cNvSpPr/>
+          <p:nvPr/>
+        </p:nvSpPr>
+        <p:spPr>
+          <a:xfrm>
+            <a:off x="39153" y="109410"/>
+            <a:ext cx="720000" cy="540000"/>
+          </a:xfrm>
+          <a:prstGeom prst="rect">
+            <a:avLst/>
+          </a:prstGeom>
+          <a:solidFill>
+            <a:schemeClr val="accent1">
+              <a:lumMod val="40000"/>
+              <a:lumOff val="60000"/>
+            </a:schemeClr>
+          </a:solidFill>
+          <a:ln>
+            <a:solidFill>
+              <a:schemeClr val="accent1">
+                <a:lumMod val="50000"/>
+              </a:schemeClr>
+            </a:solidFill>
+          </a:ln>
+        </p:spPr>
+        <p:style>
+          <a:lnRef idx="2">
+            <a:schemeClr val="accent1">
+              <a:shade val="50000"/>
+            </a:schemeClr>
+          </a:lnRef>
+          <a:fillRef idx="1">
+            <a:schemeClr val="accent1"/>
+          </a:fillRef>
+          <a:effectRef idx="0">
+            <a:schemeClr val="accent1"/>
+          </a:effectRef>
+          <a:fontRef idx="minor">
+            <a:schemeClr val="lt1"/>
+          </a:fontRef>
+        </p:style>
+        <p:txBody>
+          <a:bodyPr wrap="square" lIns="0" rIns="0" rtlCol="0" anchor="ctr"/>
+          <a:lstStyle/>
+          <a:p>
+            <a:pPr algn="ctr"/>
+            <a:r>
+              <a:rPr lang="en-US" sz="2000" dirty="0">
+                <a:solidFill>
+                  <a:schemeClr val="tx1"/>
+                </a:solidFill>
+              </a:rPr>
+              <a:t>6</a:t>
+            </a:r>
+            <a:endParaRPr lang="en-AU" sz="2000" dirty="0">
+              <a:solidFill>
+                <a:schemeClr val="tx1"/>
+              </a:solidFill>
+            </a:endParaRPr>
+          </a:p>
+        </p:txBody>
+      </p:sp>
+      <p:sp>
+        <p:nvSpPr>
+          <p:cNvPr id="6" name="Rectangle 5"/>
+          <p:cNvSpPr/>
+          <p:nvPr/>
+        </p:nvSpPr>
+        <p:spPr>
+          <a:xfrm>
+            <a:off x="831153" y="109410"/>
+            <a:ext cx="7380000" cy="540000"/>
+          </a:xfrm>
+          <a:prstGeom prst="rect">
+            <a:avLst/>
+          </a:prstGeom>
+          <a:ln>
+            <a:solidFill>
+              <a:schemeClr val="accent1">
+                <a:lumMod val="50000"/>
+              </a:schemeClr>
+            </a:solidFill>
+          </a:ln>
+        </p:spPr>
+        <p:style>
+          <a:lnRef idx="2">
+            <a:schemeClr val="accent1">
+              <a:shade val="50000"/>
+            </a:schemeClr>
+          </a:lnRef>
+          <a:fillRef idx="1">
+            <a:schemeClr val="accent1"/>
+          </a:fillRef>
+          <a:effectRef idx="0">
+            <a:schemeClr val="accent1"/>
+          </a:effectRef>
+          <a:fontRef idx="minor">
+            <a:schemeClr val="lt1"/>
+          </a:fontRef>
+        </p:style>
+        <p:txBody>
+          <a:bodyPr rtlCol="0" anchor="ctr"/>
+          <a:lstStyle/>
+          <a:p>
+            <a:pPr algn="ctr"/>
+            <a:r>
+              <a:rPr lang="en-AU" sz="2800" dirty="0" smtClean="0"/>
+              <a:t>Property view calendar</a:t>
+            </a:r>
+            <a:endParaRPr lang="en-AU" sz="2800" dirty="0"/>
+          </a:p>
+        </p:txBody>
+      </p:sp>
+      <p:sp>
+        <p:nvSpPr>
+          <p:cNvPr id="7" name="Rectangle 6"/>
+          <p:cNvSpPr/>
+          <p:nvPr/>
+        </p:nvSpPr>
+        <p:spPr>
+          <a:xfrm>
+            <a:off x="39153" y="822470"/>
+            <a:ext cx="9828000" cy="2340000"/>
+          </a:xfrm>
+          <a:prstGeom prst="rect">
+            <a:avLst/>
+          </a:prstGeom>
+          <a:solidFill>
+            <a:schemeClr val="tx2">
+              <a:lumMod val="20000"/>
+              <a:lumOff val="80000"/>
+            </a:schemeClr>
+          </a:solidFill>
+          <a:ln>
+            <a:solidFill>
+              <a:schemeClr val="accent1">
+                <a:lumMod val="50000"/>
+              </a:schemeClr>
+            </a:solidFill>
+          </a:ln>
+        </p:spPr>
+        <p:style>
+          <a:lnRef idx="2">
+            <a:schemeClr val="accent1">
+              <a:shade val="50000"/>
+            </a:schemeClr>
+          </a:lnRef>
+          <a:fillRef idx="1">
+            <a:schemeClr val="accent1"/>
+          </a:fillRef>
+          <a:effectRef idx="0">
+            <a:schemeClr val="accent1"/>
+          </a:effectRef>
+          <a:fontRef idx="minor">
+            <a:schemeClr val="lt1"/>
+          </a:fontRef>
+        </p:style>
+        <p:txBody>
+          <a:bodyPr rtlCol="0" anchor="t" anchorCtr="0"/>
+          <a:lstStyle/>
+          <a:p>
+            <a:r>
+              <a:rPr lang="en-US" sz="2400" dirty="0">
+                <a:solidFill>
+                  <a:schemeClr val="tx1"/>
+                </a:solidFill>
+              </a:rPr>
+              <a:t>As a tenant, I want to </a:t>
+            </a:r>
+            <a:r>
+              <a:rPr lang="en-US" sz="2400" dirty="0" smtClean="0">
+                <a:solidFill>
+                  <a:schemeClr val="tx1"/>
+                </a:solidFill>
+              </a:rPr>
+              <a:t>be </a:t>
+            </a:r>
+            <a:r>
+              <a:rPr lang="en-US" sz="2400" dirty="0">
+                <a:solidFill>
+                  <a:schemeClr val="tx1"/>
+                </a:solidFill>
+              </a:rPr>
+              <a:t>able to view a calendar, so that I can see what inspection times are available.</a:t>
+            </a:r>
+            <a:endParaRPr lang="en-AU" sz="2400" dirty="0">
+              <a:solidFill>
+                <a:schemeClr val="tx1"/>
+              </a:solidFill>
+            </a:endParaRPr>
+          </a:p>
+        </p:txBody>
+      </p:sp>
+      <p:sp>
+        <p:nvSpPr>
+          <p:cNvPr id="8" name="Rectangle 7"/>
+          <p:cNvSpPr/>
+          <p:nvPr/>
+        </p:nvSpPr>
+        <p:spPr>
+          <a:xfrm>
+            <a:off x="39153" y="3335530"/>
+            <a:ext cx="9828000" cy="1620000"/>
+          </a:xfrm>
+          <a:prstGeom prst="rect">
+            <a:avLst/>
+          </a:prstGeom>
+          <a:solidFill>
+            <a:schemeClr val="accent1">
+              <a:lumMod val="20000"/>
+              <a:lumOff val="80000"/>
+            </a:schemeClr>
+          </a:solidFill>
+          <a:ln>
+            <a:solidFill>
+              <a:schemeClr val="accent1">
+                <a:lumMod val="50000"/>
+              </a:schemeClr>
+            </a:solidFill>
+          </a:ln>
+        </p:spPr>
+        <p:style>
+          <a:lnRef idx="2">
+            <a:schemeClr val="accent1">
+              <a:shade val="50000"/>
+            </a:schemeClr>
+          </a:lnRef>
+          <a:fillRef idx="1">
+            <a:schemeClr val="accent1"/>
+          </a:fillRef>
+          <a:effectRef idx="0">
+            <a:schemeClr val="accent1"/>
+          </a:effectRef>
+          <a:fontRef idx="minor">
+            <a:schemeClr val="lt1"/>
+          </a:fontRef>
+        </p:style>
+        <p:txBody>
+          <a:bodyPr tIns="36000" rtlCol="0" anchor="t" anchorCtr="0"/>
+          <a:lstStyle/>
+          <a:p>
+            <a:r>
+              <a:rPr lang="en-AU" sz="2000" dirty="0">
+                <a:solidFill>
+                  <a:schemeClr val="tx1"/>
+                </a:solidFill>
+              </a:rPr>
+              <a:t>Acceptance Criteria</a:t>
+            </a:r>
+          </a:p>
+          <a:p>
+            <a:pPr marL="179388" indent="-179388">
+              <a:buFont typeface="Arial" pitchFamily="34" charset="0"/>
+              <a:buChar char="•"/>
+            </a:pPr>
+            <a:r>
+              <a:rPr lang="en-US" sz="2000" dirty="0" smtClean="0">
+                <a:solidFill>
+                  <a:schemeClr val="tx1"/>
+                </a:solidFill>
+              </a:rPr>
+              <a:t>Can </a:t>
+            </a:r>
+            <a:r>
+              <a:rPr lang="en-US" sz="2000" dirty="0">
+                <a:solidFill>
+                  <a:schemeClr val="tx1"/>
+                </a:solidFill>
+              </a:rPr>
+              <a:t>website users easily </a:t>
+            </a:r>
+            <a:r>
+              <a:rPr lang="en-US" sz="2000" dirty="0" smtClean="0">
+                <a:solidFill>
+                  <a:schemeClr val="tx1"/>
+                </a:solidFill>
+              </a:rPr>
+              <a:t>launch a calendar with available viewing times listed?</a:t>
+            </a:r>
+          </a:p>
+          <a:p>
+            <a:pPr marL="179388" indent="-179388">
+              <a:buFont typeface="Arial" pitchFamily="34" charset="0"/>
+              <a:buChar char="•"/>
+            </a:pPr>
+            <a:r>
+              <a:rPr lang="en-US" sz="2000" dirty="0" smtClean="0">
+                <a:solidFill>
+                  <a:schemeClr val="tx1"/>
+                </a:solidFill>
+              </a:rPr>
+              <a:t>Is it clear which property the calendar is linked too?</a:t>
+            </a:r>
+          </a:p>
+          <a:p>
+            <a:pPr marL="179388" indent="-179388">
+              <a:buFont typeface="Arial" pitchFamily="34" charset="0"/>
+              <a:buChar char="•"/>
+            </a:pPr>
+            <a:r>
+              <a:rPr lang="en-US" sz="2000" dirty="0" smtClean="0">
+                <a:solidFill>
+                  <a:schemeClr val="tx1"/>
+                </a:solidFill>
+              </a:rPr>
+              <a:t>Is it clear which times are booked/still available?</a:t>
+            </a:r>
+            <a:endParaRPr lang="en-US" sz="2000" dirty="0">
+              <a:solidFill>
+                <a:schemeClr val="tx1"/>
+              </a:solidFill>
+            </a:endParaRPr>
+          </a:p>
+        </p:txBody>
+      </p:sp>
+      <p:sp>
+        <p:nvSpPr>
+          <p:cNvPr id="11" name="Rectangle 10"/>
+          <p:cNvSpPr/>
+          <p:nvPr/>
+        </p:nvSpPr>
+        <p:spPr>
+          <a:xfrm>
+            <a:off x="9147153" y="109410"/>
+            <a:ext cx="720000" cy="540000"/>
+          </a:xfrm>
+          <a:prstGeom prst="rect">
+            <a:avLst/>
+          </a:prstGeom>
+          <a:solidFill>
+            <a:srgbClr val="CCF0CD">
+              <a:alpha val="20000"/>
+            </a:srgbClr>
+          </a:solidFill>
+          <a:ln>
+            <a:solidFill>
+              <a:schemeClr val="accent1">
+                <a:lumMod val="50000"/>
+              </a:schemeClr>
+            </a:solidFill>
+          </a:ln>
+        </p:spPr>
+        <p:style>
+          <a:lnRef idx="2">
+            <a:schemeClr val="accent1">
+              <a:shade val="50000"/>
+            </a:schemeClr>
+          </a:lnRef>
+          <a:fillRef idx="1">
+            <a:schemeClr val="accent1"/>
+          </a:fillRef>
+          <a:effectRef idx="0">
+            <a:schemeClr val="accent1"/>
+          </a:effectRef>
+          <a:fontRef idx="minor">
+            <a:schemeClr val="lt1"/>
+          </a:fontRef>
+        </p:style>
+        <p:txBody>
+          <a:bodyPr wrap="square" lIns="0" rIns="0" rtlCol="0" anchor="ctr"/>
+          <a:lstStyle/>
+          <a:p>
+            <a:pPr algn="ctr"/>
+            <a:r>
+              <a:rPr lang="en-AU" sz="2000" dirty="0">
+                <a:solidFill>
+                  <a:schemeClr val="tx1"/>
+                </a:solidFill>
+              </a:rPr>
+              <a:t>Story Points</a:t>
+            </a:r>
+          </a:p>
+        </p:txBody>
+      </p:sp>
+      <p:sp>
+        <p:nvSpPr>
+          <p:cNvPr id="12" name="Rectangle 11"/>
+          <p:cNvSpPr/>
+          <p:nvPr/>
+        </p:nvSpPr>
+        <p:spPr>
+          <a:xfrm>
+            <a:off x="8283153" y="109410"/>
+            <a:ext cx="792000" cy="540000"/>
+          </a:xfrm>
+          <a:prstGeom prst="rect">
+            <a:avLst/>
+          </a:prstGeom>
+          <a:solidFill>
+            <a:schemeClr val="accent4">
+              <a:lumMod val="20000"/>
+              <a:lumOff val="80000"/>
+            </a:schemeClr>
+          </a:solidFill>
+          <a:ln>
+            <a:solidFill>
+              <a:schemeClr val="accent1">
+                <a:lumMod val="50000"/>
+              </a:schemeClr>
+            </a:solidFill>
+          </a:ln>
+        </p:spPr>
+        <p:style>
+          <a:lnRef idx="2">
+            <a:schemeClr val="accent1">
+              <a:shade val="50000"/>
+            </a:schemeClr>
+          </a:lnRef>
+          <a:fillRef idx="1">
+            <a:schemeClr val="accent1"/>
+          </a:fillRef>
+          <a:effectRef idx="0">
+            <a:schemeClr val="accent1"/>
+          </a:effectRef>
+          <a:fontRef idx="minor">
+            <a:schemeClr val="lt1"/>
+          </a:fontRef>
+        </p:style>
+        <p:txBody>
+          <a:bodyPr wrap="none" lIns="0" rIns="0" rtlCol="0" anchor="ctr"/>
+          <a:lstStyle/>
+          <a:p>
+            <a:pPr algn="ctr"/>
+            <a:r>
+              <a:rPr lang="en-AU" sz="2000" dirty="0" smtClean="0">
+                <a:solidFill>
+                  <a:schemeClr val="tx1"/>
+                </a:solidFill>
+              </a:rPr>
+              <a:t>medium</a:t>
+            </a:r>
+            <a:endParaRPr lang="en-AU" sz="2000" dirty="0">
+              <a:solidFill>
+                <a:schemeClr val="tx1"/>
+              </a:solidFill>
+            </a:endParaRPr>
+          </a:p>
+        </p:txBody>
+      </p:sp>
+      <p:sp>
+        <p:nvSpPr>
+          <p:cNvPr id="13" name="Rectangle 12"/>
+          <p:cNvSpPr/>
+          <p:nvPr/>
+        </p:nvSpPr>
+        <p:spPr>
+          <a:xfrm>
+            <a:off x="39153" y="5128590"/>
+            <a:ext cx="9828000" cy="1620000"/>
+          </a:xfrm>
+          <a:prstGeom prst="rect">
+            <a:avLst/>
+          </a:prstGeom>
+          <a:solidFill>
+            <a:schemeClr val="bg1"/>
+          </a:solidFill>
+          <a:ln>
+            <a:solidFill>
+              <a:schemeClr val="accent1">
+                <a:lumMod val="50000"/>
+              </a:schemeClr>
+            </a:solidFill>
+          </a:ln>
+        </p:spPr>
+        <p:style>
+          <a:lnRef idx="2">
+            <a:schemeClr val="accent1">
+              <a:shade val="50000"/>
+            </a:schemeClr>
+          </a:lnRef>
+          <a:fillRef idx="1">
+            <a:schemeClr val="accent1"/>
+          </a:fillRef>
+          <a:effectRef idx="0">
+            <a:schemeClr val="accent1"/>
+          </a:effectRef>
+          <a:fontRef idx="minor">
+            <a:schemeClr val="lt1"/>
+          </a:fontRef>
+        </p:style>
+        <p:txBody>
+          <a:bodyPr tIns="36000" rtlCol="0" anchor="t" anchorCtr="0"/>
+          <a:lstStyle/>
+          <a:p>
+            <a:r>
+              <a:rPr lang="en-AU" sz="2000" dirty="0">
+                <a:solidFill>
+                  <a:schemeClr val="tx1"/>
+                </a:solidFill>
+              </a:rPr>
+              <a:t>Notes</a:t>
+            </a:r>
+          </a:p>
+          <a:p>
+            <a:endParaRPr lang="en-AU" sz="2000" dirty="0">
+              <a:solidFill>
+                <a:schemeClr val="tx1"/>
+              </a:solidFill>
+            </a:endParaRPr>
+          </a:p>
+        </p:txBody>
+      </p:sp>
+    </p:spTree>
+    <p:extLst>
+      <p:ext uri="{BB962C8B-B14F-4D97-AF65-F5344CB8AC3E}">
+        <p14:creationId xmlns:p14="http://schemas.microsoft.com/office/powerpoint/2010/main" val="725944230"/>
+      </p:ext>
+    </p:extLst>
+  </p:cSld>
+  <p:clrMapOvr>
+    <a:masterClrMapping/>
+  </p:clrMapOvr>
+</p:sld>
+</file>
+
+<file path=ppt/slides/slide9.xml><?xml version="1.0" encoding="utf-8"?>
+<p:sld xmlns:a="http://schemas.openxmlformats.org/drawingml/2006/main" xmlns:r="http://schemas.openxmlformats.org/officeDocument/2006/relationships" xmlns:p="http://schemas.openxmlformats.org/presentationml/2006/main">
+  <p:cSld>
+    <p:spTree>
+      <p:nvGrpSpPr>
+        <p:cNvPr id="1" name=""/>
+        <p:cNvGrpSpPr/>
+        <p:nvPr/>
+      </p:nvGrpSpPr>
+      <p:grpSpPr>
+        <a:xfrm>
+          <a:off x="0" y="0"/>
+          <a:ext cx="0" cy="0"/>
+          <a:chOff x="0" y="0"/>
+          <a:chExt cx="0" cy="0"/>
+        </a:xfrm>
+      </p:grpSpPr>
+      <p:sp>
+        <p:nvSpPr>
+          <p:cNvPr id="4" name="Rectangle 3"/>
+          <p:cNvSpPr/>
+          <p:nvPr/>
+        </p:nvSpPr>
+        <p:spPr>
+          <a:xfrm>
+            <a:off x="39153" y="109410"/>
+            <a:ext cx="720000" cy="540000"/>
+          </a:xfrm>
+          <a:prstGeom prst="rect">
+            <a:avLst/>
+          </a:prstGeom>
+          <a:solidFill>
+            <a:schemeClr val="accent1">
+              <a:lumMod val="40000"/>
+              <a:lumOff val="60000"/>
+            </a:schemeClr>
+          </a:solidFill>
+          <a:ln>
+            <a:solidFill>
+              <a:schemeClr val="accent1">
+                <a:lumMod val="50000"/>
+              </a:schemeClr>
+            </a:solidFill>
+          </a:ln>
+        </p:spPr>
+        <p:style>
+          <a:lnRef idx="2">
+            <a:schemeClr val="accent1">
+              <a:shade val="50000"/>
+            </a:schemeClr>
+          </a:lnRef>
+          <a:fillRef idx="1">
+            <a:schemeClr val="accent1"/>
+          </a:fillRef>
+          <a:effectRef idx="0">
+            <a:schemeClr val="accent1"/>
+          </a:effectRef>
+          <a:fontRef idx="minor">
+            <a:schemeClr val="lt1"/>
+          </a:fontRef>
+        </p:style>
+        <p:txBody>
+          <a:bodyPr wrap="square" lIns="0" rIns="0" rtlCol="0" anchor="ctr"/>
+          <a:lstStyle/>
+          <a:p>
+            <a:pPr algn="ctr"/>
+            <a:r>
+              <a:rPr lang="en-US" sz="2000" dirty="0">
+                <a:solidFill>
+                  <a:schemeClr val="tx1"/>
+                </a:solidFill>
+              </a:rPr>
+              <a:t>7</a:t>
+            </a:r>
+            <a:endParaRPr lang="en-AU" sz="2000" dirty="0">
+              <a:solidFill>
+                <a:schemeClr val="tx1"/>
+              </a:solidFill>
+            </a:endParaRPr>
+          </a:p>
+        </p:txBody>
+      </p:sp>
+      <p:sp>
+        <p:nvSpPr>
+          <p:cNvPr id="6" name="Rectangle 5"/>
+          <p:cNvSpPr/>
+          <p:nvPr/>
+        </p:nvSpPr>
+        <p:spPr>
+          <a:xfrm>
+            <a:off x="831153" y="109410"/>
+            <a:ext cx="7380000" cy="540000"/>
+          </a:xfrm>
+          <a:prstGeom prst="rect">
+            <a:avLst/>
+          </a:prstGeom>
+          <a:ln>
+            <a:solidFill>
+              <a:schemeClr val="accent1">
+                <a:lumMod val="50000"/>
+              </a:schemeClr>
+            </a:solidFill>
+          </a:ln>
+        </p:spPr>
+        <p:style>
+          <a:lnRef idx="2">
+            <a:schemeClr val="accent1">
+              <a:shade val="50000"/>
+            </a:schemeClr>
+          </a:lnRef>
+          <a:fillRef idx="1">
+            <a:schemeClr val="accent1"/>
+          </a:fillRef>
+          <a:effectRef idx="0">
+            <a:schemeClr val="accent1"/>
+          </a:effectRef>
+          <a:fontRef idx="minor">
+            <a:schemeClr val="lt1"/>
+          </a:fontRef>
+        </p:style>
+        <p:txBody>
+          <a:bodyPr rtlCol="0" anchor="ctr"/>
+          <a:lstStyle/>
+          <a:p>
+            <a:pPr algn="ctr"/>
+            <a:r>
+              <a:rPr lang="en-AU" sz="2800" dirty="0" smtClean="0"/>
+              <a:t>Property Id search</a:t>
+            </a:r>
+            <a:endParaRPr lang="en-AU" sz="2800" dirty="0"/>
+          </a:p>
+        </p:txBody>
+      </p:sp>
+      <p:sp>
+        <p:nvSpPr>
+          <p:cNvPr id="7" name="Rectangle 6"/>
+          <p:cNvSpPr/>
+          <p:nvPr/>
+        </p:nvSpPr>
+        <p:spPr>
+          <a:xfrm>
+            <a:off x="39153" y="822470"/>
+            <a:ext cx="9828000" cy="2340000"/>
+          </a:xfrm>
+          <a:prstGeom prst="rect">
+            <a:avLst/>
+          </a:prstGeom>
+          <a:solidFill>
+            <a:schemeClr val="tx2">
+              <a:lumMod val="20000"/>
+              <a:lumOff val="80000"/>
+            </a:schemeClr>
+          </a:solidFill>
+          <a:ln>
+            <a:solidFill>
+              <a:schemeClr val="accent1">
+                <a:lumMod val="50000"/>
+              </a:schemeClr>
+            </a:solidFill>
+          </a:ln>
+        </p:spPr>
+        <p:style>
+          <a:lnRef idx="2">
+            <a:schemeClr val="accent1">
+              <a:shade val="50000"/>
+            </a:schemeClr>
+          </a:lnRef>
+          <a:fillRef idx="1">
+            <a:schemeClr val="accent1"/>
+          </a:fillRef>
+          <a:effectRef idx="0">
+            <a:schemeClr val="accent1"/>
+          </a:effectRef>
+          <a:fontRef idx="minor">
+            <a:schemeClr val="lt1"/>
+          </a:fontRef>
+        </p:style>
+        <p:txBody>
+          <a:bodyPr rtlCol="0" anchor="t" anchorCtr="0"/>
+          <a:lstStyle/>
+          <a:p>
+            <a:r>
+              <a:rPr lang="en-US" sz="2400" dirty="0">
+                <a:solidFill>
+                  <a:schemeClr val="tx1"/>
+                </a:solidFill>
+              </a:rPr>
+              <a:t>As a prospective tenant, I want to be able to search by a property ID, so that I can view specific properties.</a:t>
+            </a:r>
+            <a:endParaRPr lang="en-AU" sz="2400" dirty="0">
+              <a:solidFill>
+                <a:schemeClr val="tx1"/>
+              </a:solidFill>
+            </a:endParaRPr>
+          </a:p>
+        </p:txBody>
+      </p:sp>
+      <p:sp>
+        <p:nvSpPr>
+          <p:cNvPr id="8" name="Rectangle 7"/>
+          <p:cNvSpPr/>
+          <p:nvPr/>
+        </p:nvSpPr>
+        <p:spPr>
+          <a:xfrm>
+            <a:off x="39153" y="3335530"/>
+            <a:ext cx="9828000" cy="1620000"/>
+          </a:xfrm>
+          <a:prstGeom prst="rect">
+            <a:avLst/>
+          </a:prstGeom>
+          <a:solidFill>
+            <a:schemeClr val="accent1">
+              <a:lumMod val="20000"/>
+              <a:lumOff val="80000"/>
+            </a:schemeClr>
+          </a:solidFill>
+          <a:ln>
+            <a:solidFill>
+              <a:schemeClr val="accent1">
+                <a:lumMod val="50000"/>
+              </a:schemeClr>
+            </a:solidFill>
+          </a:ln>
+        </p:spPr>
+        <p:style>
+          <a:lnRef idx="2">
+            <a:schemeClr val="accent1">
+              <a:shade val="50000"/>
+            </a:schemeClr>
+          </a:lnRef>
+          <a:fillRef idx="1">
+            <a:schemeClr val="accent1"/>
+          </a:fillRef>
+          <a:effectRef idx="0">
+            <a:schemeClr val="accent1"/>
+          </a:effectRef>
+          <a:fontRef idx="minor">
+            <a:schemeClr val="lt1"/>
+          </a:fontRef>
+        </p:style>
+        <p:txBody>
+          <a:bodyPr tIns="36000" rtlCol="0" anchor="t" anchorCtr="0"/>
+          <a:lstStyle/>
+          <a:p>
+            <a:r>
+              <a:rPr lang="en-AU" sz="2000" dirty="0" smtClean="0">
+                <a:solidFill>
+                  <a:schemeClr val="tx1"/>
+                </a:solidFill>
+              </a:rPr>
+              <a:t>Acceptance Criteria</a:t>
+            </a:r>
+          </a:p>
+          <a:p>
+            <a:pPr marL="179388" indent="-179388">
+              <a:buFont typeface="Arial" pitchFamily="34" charset="0"/>
+              <a:buChar char="•"/>
+            </a:pPr>
+            <a:r>
+              <a:rPr lang="en-AU" sz="2000" dirty="0" smtClean="0">
+                <a:solidFill>
+                  <a:schemeClr val="tx1"/>
+                </a:solidFill>
+              </a:rPr>
+              <a:t> </a:t>
+            </a:r>
+            <a:r>
+              <a:rPr lang="en-AU" sz="2000" dirty="0">
+                <a:solidFill>
+                  <a:schemeClr val="tx1"/>
+                </a:solidFill>
+              </a:rPr>
+              <a:t>I</a:t>
+            </a:r>
+            <a:r>
+              <a:rPr lang="en-AU" sz="2000" dirty="0" smtClean="0">
+                <a:solidFill>
+                  <a:schemeClr val="tx1"/>
+                </a:solidFill>
+              </a:rPr>
+              <a:t>s the website searchable by property id?</a:t>
+            </a:r>
+          </a:p>
+          <a:p>
+            <a:pPr marL="179388" indent="-179388">
+              <a:buFont typeface="Arial" pitchFamily="34" charset="0"/>
+              <a:buChar char="•"/>
+            </a:pPr>
+            <a:r>
+              <a:rPr lang="en-US" sz="2000" dirty="0" smtClean="0">
+                <a:solidFill>
+                  <a:schemeClr val="tx1"/>
+                </a:solidFill>
+              </a:rPr>
+              <a:t>Does each property have a clear property id?</a:t>
+            </a:r>
+          </a:p>
+          <a:p>
+            <a:pPr marL="179388" indent="-179388">
+              <a:buFont typeface="Arial" pitchFamily="34" charset="0"/>
+              <a:buChar char="•"/>
+            </a:pPr>
+            <a:r>
+              <a:rPr lang="en-US" sz="2000" dirty="0" smtClean="0">
+                <a:solidFill>
+                  <a:schemeClr val="tx1"/>
+                </a:solidFill>
+              </a:rPr>
+              <a:t>Is the property id unique?</a:t>
+            </a:r>
+            <a:endParaRPr lang="en-US" sz="2000" dirty="0" smtClean="0">
+              <a:solidFill>
+                <a:schemeClr val="tx1"/>
+              </a:solidFill>
+            </a:endParaRPr>
+          </a:p>
+        </p:txBody>
+      </p:sp>
+      <p:sp>
+        <p:nvSpPr>
+          <p:cNvPr id="11" name="Rectangle 10"/>
+          <p:cNvSpPr/>
+          <p:nvPr/>
+        </p:nvSpPr>
+        <p:spPr>
+          <a:xfrm>
+            <a:off x="9147153" y="109410"/>
+            <a:ext cx="720000" cy="540000"/>
+          </a:xfrm>
+          <a:prstGeom prst="rect">
+            <a:avLst/>
+          </a:prstGeom>
+          <a:solidFill>
+            <a:srgbClr val="CCF0CD">
+              <a:alpha val="20000"/>
+            </a:srgbClr>
+          </a:solidFill>
+          <a:ln>
+            <a:solidFill>
+              <a:schemeClr val="accent1">
+                <a:lumMod val="50000"/>
+              </a:schemeClr>
+            </a:solidFill>
+          </a:ln>
+        </p:spPr>
+        <p:style>
+          <a:lnRef idx="2">
+            <a:schemeClr val="accent1">
+              <a:shade val="50000"/>
+            </a:schemeClr>
+          </a:lnRef>
+          <a:fillRef idx="1">
+            <a:schemeClr val="accent1"/>
+          </a:fillRef>
+          <a:effectRef idx="0">
+            <a:schemeClr val="accent1"/>
+          </a:effectRef>
+          <a:fontRef idx="minor">
+            <a:schemeClr val="lt1"/>
+          </a:fontRef>
+        </p:style>
+        <p:txBody>
+          <a:bodyPr wrap="square" lIns="0" rIns="0" rtlCol="0" anchor="ctr"/>
+          <a:lstStyle/>
+          <a:p>
+            <a:pPr algn="ctr"/>
+            <a:r>
+              <a:rPr lang="en-AU" sz="2000" dirty="0">
+                <a:solidFill>
+                  <a:schemeClr val="tx1"/>
+                </a:solidFill>
+              </a:rPr>
+              <a:t>Story Points</a:t>
+            </a:r>
+          </a:p>
+        </p:txBody>
+      </p:sp>
+      <p:sp>
+        <p:nvSpPr>
+          <p:cNvPr id="12" name="Rectangle 11"/>
+          <p:cNvSpPr/>
+          <p:nvPr/>
+        </p:nvSpPr>
+        <p:spPr>
+          <a:xfrm>
+            <a:off x="8283153" y="109410"/>
+            <a:ext cx="792000" cy="540000"/>
+          </a:xfrm>
+          <a:prstGeom prst="rect">
+            <a:avLst/>
+          </a:prstGeom>
+          <a:solidFill>
+            <a:schemeClr val="accent4">
+              <a:lumMod val="20000"/>
+              <a:lumOff val="80000"/>
+            </a:schemeClr>
+          </a:solidFill>
+          <a:ln>
+            <a:solidFill>
+              <a:schemeClr val="accent1">
+                <a:lumMod val="50000"/>
+              </a:schemeClr>
+            </a:solidFill>
+          </a:ln>
+        </p:spPr>
+        <p:style>
+          <a:lnRef idx="2">
+            <a:schemeClr val="accent1">
+              <a:shade val="50000"/>
+            </a:schemeClr>
+          </a:lnRef>
+          <a:fillRef idx="1">
+            <a:schemeClr val="accent1"/>
+          </a:fillRef>
+          <a:effectRef idx="0">
+            <a:schemeClr val="accent1"/>
+          </a:effectRef>
+          <a:fontRef idx="minor">
+            <a:schemeClr val="lt1"/>
+          </a:fontRef>
+        </p:style>
+        <p:txBody>
+          <a:bodyPr wrap="none" lIns="0" rIns="0" rtlCol="0" anchor="ctr"/>
+          <a:lstStyle/>
+          <a:p>
+            <a:pPr algn="ctr"/>
+            <a:r>
+              <a:rPr lang="en-AU" sz="2000" dirty="0">
+                <a:solidFill>
+                  <a:schemeClr val="tx1"/>
+                </a:solidFill>
+              </a:rPr>
+              <a:t>HIGH</a:t>
+            </a:r>
+          </a:p>
+        </p:txBody>
+      </p:sp>
+      <p:sp>
+        <p:nvSpPr>
+          <p:cNvPr id="13" name="Rectangle 12"/>
+          <p:cNvSpPr/>
+          <p:nvPr/>
+        </p:nvSpPr>
+        <p:spPr>
+          <a:xfrm>
+            <a:off x="39153" y="5128590"/>
+            <a:ext cx="9828000" cy="1620000"/>
+          </a:xfrm>
+          <a:prstGeom prst="rect">
+            <a:avLst/>
+          </a:prstGeom>
+          <a:solidFill>
+            <a:schemeClr val="bg1"/>
+          </a:solidFill>
+          <a:ln>
+            <a:solidFill>
+              <a:schemeClr val="accent1">
+                <a:lumMod val="50000"/>
+              </a:schemeClr>
+            </a:solidFill>
+          </a:ln>
+        </p:spPr>
+        <p:style>
+          <a:lnRef idx="2">
+            <a:schemeClr val="accent1">
+              <a:shade val="50000"/>
+            </a:schemeClr>
+          </a:lnRef>
+          <a:fillRef idx="1">
+            <a:schemeClr val="accent1"/>
+          </a:fillRef>
+          <a:effectRef idx="0">
+            <a:schemeClr val="accent1"/>
+          </a:effectRef>
+          <a:fontRef idx="minor">
+            <a:schemeClr val="lt1"/>
+          </a:fontRef>
+        </p:style>
+        <p:txBody>
+          <a:bodyPr tIns="36000" rtlCol="0" anchor="t" anchorCtr="0"/>
+          <a:lstStyle/>
+          <a:p>
+            <a:r>
+              <a:rPr lang="en-AU" sz="2000" dirty="0">
+                <a:solidFill>
+                  <a:schemeClr val="tx1"/>
+                </a:solidFill>
+              </a:rPr>
+              <a:t>Notes</a:t>
+            </a:r>
+          </a:p>
+          <a:p>
+            <a:endParaRPr lang="en-AU" sz="2000" dirty="0">
+              <a:solidFill>
+                <a:schemeClr val="tx1"/>
+              </a:solidFill>
+            </a:endParaRPr>
+          </a:p>
+        </p:txBody>
+      </p:sp>
+    </p:spTree>
+    <p:extLst>
+      <p:ext uri="{BB962C8B-B14F-4D97-AF65-F5344CB8AC3E}">
+        <p14:creationId xmlns:p14="http://schemas.microsoft.com/office/powerpoint/2010/main" val="157669145"/>
       </p:ext>
     </p:extLst>
   </p:cSld>

</xml_diff>